<commit_message>
atualização do plano de trabalho
</commit_message>
<xml_diff>
--- a/downloads/PlanoDeTrabalho.pptx
+++ b/downloads/PlanoDeTrabalho.pptx
@@ -6946,8 +6946,8 @@
         </p:nvSpPr>
         <p:spPr>
           <a:xfrm>
-            <a:off x="1524263" y="2231797"/>
-            <a:ext cx="6012287" cy="3477875"/>
+            <a:off x="973010" y="1541053"/>
+            <a:ext cx="10245979" cy="4955203"/>
           </a:xfrm>
           <a:prstGeom prst="rect">
             <a:avLst/>
@@ -6955,7 +6955,7 @@
           <a:noFill/>
         </p:spPr>
         <p:txBody>
-          <a:bodyPr wrap="none" rtlCol="0">
+          <a:bodyPr wrap="square" rtlCol="0">
             <a:spAutoFit/>
           </a:bodyPr>
           <a:lstStyle/>
@@ -6989,7 +6989,7 @@
               <a:rPr lang="pt-BR" sz="2400" dirty="0">
                 <a:latin typeface="+mj-lt"/>
               </a:rPr>
-              <a:t>Como as demandas devem chegar ao grupo?</a:t>
+              <a:t>Os projetos serão prospectados por meio de workshops a serem realizados com cada subsecretaria.</a:t>
             </a:r>
           </a:p>
           <a:p>
@@ -7001,7 +7001,7 @@
               <a:rPr lang="pt-BR" sz="2400" dirty="0">
                 <a:latin typeface="+mj-lt"/>
               </a:rPr>
-              <a:t>Como elas devem ser priorizadas?</a:t>
+              <a:t>Os projetos serão então consolidados pelo Grupo e serão priorizados pelo Secretário-Adjunto.</a:t>
             </a:r>
           </a:p>
           <a:p>
@@ -7013,7 +7013,7 @@
               <a:rPr lang="pt-BR" sz="2400" dirty="0">
                 <a:latin typeface="+mj-lt"/>
               </a:rPr>
-              <a:t>Validar as formas de entrega</a:t>
+              <a:t>Os projetos serão desenvolvidos com a colaboração de representantes das subsecretarias definidos por ocasião dos workshops.</a:t>
             </a:r>
           </a:p>
           <a:p>
@@ -7025,7 +7025,7 @@
               <a:rPr lang="pt-BR" sz="2400" dirty="0">
                 <a:latin typeface="+mj-lt"/>
               </a:rPr>
-              <a:t>Criação de um portal do GT na intranet? </a:t>
+              <a:t>Esses representantes posteriormente validarão os produtos e suas formas de entrega.</a:t>
             </a:r>
           </a:p>
           <a:p>
@@ -7037,7 +7037,7 @@
               <a:rPr lang="pt-BR" sz="2400" dirty="0">
                 <a:latin typeface="+mj-lt"/>
               </a:rPr>
-              <a:t>Realização de </a:t>
+              <a:t>Poderão ser realizados </a:t>
             </a:r>
             <a:r>
               <a:rPr lang="pt-BR" sz="2400" b="1" dirty="0">
@@ -7048,7 +7048,7 @@
                 </a:solidFill>
                 <a:latin typeface="+mj-lt"/>
               </a:rPr>
-              <a:t>laboratórios</a:t>
+              <a:t>laboratórios.</a:t>
             </a:r>
           </a:p>
           <a:p>
@@ -7136,17 +7136,18 @@
           </p:cNvPr>
           <p:cNvCxnSpPr>
             <a:cxnSpLocks/>
+            <a:endCxn id="16" idx="1"/>
           </p:cNvCxnSpPr>
           <p:nvPr/>
         </p:nvCxnSpPr>
         <p:spPr>
           <a:xfrm>
-            <a:off x="3611880" y="4537710"/>
-            <a:ext cx="3936100" cy="1028700"/>
+            <a:off x="4169569" y="5655534"/>
+            <a:ext cx="3171592" cy="179003"/>
           </a:xfrm>
           <a:prstGeom prst="bentConnector3">
             <a:avLst>
-              <a:gd name="adj1" fmla="val 38094"/>
+              <a:gd name="adj1" fmla="val 45795"/>
             </a:avLst>
           </a:prstGeom>
           <a:ln w="28575">
@@ -7187,8 +7188,8 @@
         </p:nvSpPr>
         <p:spPr>
           <a:xfrm>
-            <a:off x="7654554" y="4820275"/>
-            <a:ext cx="3936100" cy="1446550"/>
+            <a:off x="7341161" y="5172817"/>
+            <a:ext cx="3936100" cy="1323439"/>
           </a:xfrm>
           <a:prstGeom prst="rect">
             <a:avLst/>
@@ -7202,15 +7203,15 @@
           <a:lstStyle/>
           <a:p>
             <a:r>
-              <a:rPr lang="pt-BR" sz="2200" dirty="0">
+              <a:rPr lang="pt-BR" sz="2000" dirty="0">
                 <a:latin typeface="+mj-lt"/>
               </a:rPr>
-              <a:t>Apresentação dos trabalhos para especialistas das áreas envolvidas e para a ASCOM.</a:t>
-            </a:r>
-          </a:p>
-          <a:p>
-            <a:r>
-              <a:rPr lang="pt-BR" sz="2200" b="1" dirty="0" err="1">
+              <a:t>Apresentação dos trabalhos para a ASCOM, especialistas das áreas envolvidas e demais interessados.</a:t>
+            </a:r>
+          </a:p>
+          <a:p>
+            <a:r>
+              <a:rPr lang="pt-BR" sz="2000" b="1" dirty="0" err="1">
                 <a:solidFill>
                   <a:schemeClr val="accent2">
                     <a:lumMod val="50000"/>
@@ -7221,7 +7222,7 @@
               <a:t>Brainstorm</a:t>
             </a:r>
             <a:r>
-              <a:rPr lang="pt-BR" sz="2200" b="1" dirty="0">
+              <a:rPr lang="pt-BR" sz="2000" b="1" dirty="0">
                 <a:solidFill>
                   <a:schemeClr val="accent2">
                     <a:lumMod val="50000"/>
@@ -7248,8 +7249,8 @@
         </p:nvSpPr>
         <p:spPr>
           <a:xfrm>
-            <a:off x="3600450" y="4537710"/>
-            <a:ext cx="1508760" cy="354330"/>
+            <a:off x="4126043" y="5301204"/>
+            <a:ext cx="1495425" cy="354330"/>
           </a:xfrm>
           <a:prstGeom prst="rect">
             <a:avLst/>

</xml_diff>

<commit_message>
atualização plano de trabalho
</commit_message>
<xml_diff>
--- a/downloads/PlanoDeTrabalho.pptx
+++ b/downloads/PlanoDeTrabalho.pptx
@@ -5,13 +5,14 @@
     <p:sldMasterId id="2147483648" r:id="rId1"/>
   </p:sldMasterIdLst>
   <p:handoutMasterIdLst>
-    <p:handoutMasterId r:id="rId6"/>
+    <p:handoutMasterId r:id="rId7"/>
   </p:handoutMasterIdLst>
   <p:sldIdLst>
     <p:sldId id="257" r:id="rId2"/>
-    <p:sldId id="258" r:id="rId3"/>
-    <p:sldId id="259" r:id="rId4"/>
-    <p:sldId id="260" r:id="rId5"/>
+    <p:sldId id="261" r:id="rId3"/>
+    <p:sldId id="258" r:id="rId4"/>
+    <p:sldId id="259" r:id="rId5"/>
+    <p:sldId id="260" r:id="rId6"/>
   </p:sldIdLst>
   <p:sldSz cx="12192000" cy="6858000"/>
   <p:notesSz cx="6797675" cy="9926638"/>
@@ -354,7 +355,7 @@
           <a:p>
             <a:fld id="{E6D86111-0871-4697-862B-3F6F22A696ED}" type="datetimeFigureOut">
               <a:rPr lang="pt-BR" smtClean="0"/>
-              <a:t>10/05/2018</a:t>
+              <a:t>11/05/2018</a:t>
             </a:fld>
             <a:endParaRPr lang="pt-BR"/>
           </a:p>
@@ -596,7 +597,7 @@
           <a:p>
             <a:fld id="{40750879-1695-4505-B74A-AEC693370F9E}" type="datetimeFigureOut">
               <a:rPr lang="pt-BR" smtClean="0"/>
-              <a:t>10/05/2018</a:t>
+              <a:t>11/05/2018</a:t>
             </a:fld>
             <a:endParaRPr lang="pt-BR"/>
           </a:p>
@@ -794,7 +795,7 @@
           <a:p>
             <a:fld id="{40750879-1695-4505-B74A-AEC693370F9E}" type="datetimeFigureOut">
               <a:rPr lang="pt-BR" smtClean="0"/>
-              <a:t>10/05/2018</a:t>
+              <a:t>11/05/2018</a:t>
             </a:fld>
             <a:endParaRPr lang="pt-BR"/>
           </a:p>
@@ -1002,7 +1003,7 @@
           <a:p>
             <a:fld id="{40750879-1695-4505-B74A-AEC693370F9E}" type="datetimeFigureOut">
               <a:rPr lang="pt-BR" smtClean="0"/>
-              <a:t>10/05/2018</a:t>
+              <a:t>11/05/2018</a:t>
             </a:fld>
             <a:endParaRPr lang="pt-BR"/>
           </a:p>
@@ -1200,7 +1201,7 @@
           <a:p>
             <a:fld id="{40750879-1695-4505-B74A-AEC693370F9E}" type="datetimeFigureOut">
               <a:rPr lang="pt-BR" smtClean="0"/>
-              <a:t>10/05/2018</a:t>
+              <a:t>11/05/2018</a:t>
             </a:fld>
             <a:endParaRPr lang="pt-BR"/>
           </a:p>
@@ -1475,7 +1476,7 @@
           <a:p>
             <a:fld id="{40750879-1695-4505-B74A-AEC693370F9E}" type="datetimeFigureOut">
               <a:rPr lang="pt-BR" smtClean="0"/>
-              <a:t>10/05/2018</a:t>
+              <a:t>11/05/2018</a:t>
             </a:fld>
             <a:endParaRPr lang="pt-BR"/>
           </a:p>
@@ -1740,7 +1741,7 @@
           <a:p>
             <a:fld id="{40750879-1695-4505-B74A-AEC693370F9E}" type="datetimeFigureOut">
               <a:rPr lang="pt-BR" smtClean="0"/>
-              <a:t>10/05/2018</a:t>
+              <a:t>11/05/2018</a:t>
             </a:fld>
             <a:endParaRPr lang="pt-BR"/>
           </a:p>
@@ -2152,7 +2153,7 @@
           <a:p>
             <a:fld id="{40750879-1695-4505-B74A-AEC693370F9E}" type="datetimeFigureOut">
               <a:rPr lang="pt-BR" smtClean="0"/>
-              <a:t>10/05/2018</a:t>
+              <a:t>11/05/2018</a:t>
             </a:fld>
             <a:endParaRPr lang="pt-BR"/>
           </a:p>
@@ -2293,7 +2294,7 @@
           <a:p>
             <a:fld id="{40750879-1695-4505-B74A-AEC693370F9E}" type="datetimeFigureOut">
               <a:rPr lang="pt-BR" smtClean="0"/>
-              <a:t>10/05/2018</a:t>
+              <a:t>11/05/2018</a:t>
             </a:fld>
             <a:endParaRPr lang="pt-BR"/>
           </a:p>
@@ -2406,7 +2407,7 @@
           <a:p>
             <a:fld id="{40750879-1695-4505-B74A-AEC693370F9E}" type="datetimeFigureOut">
               <a:rPr lang="pt-BR" smtClean="0"/>
-              <a:t>10/05/2018</a:t>
+              <a:t>11/05/2018</a:t>
             </a:fld>
             <a:endParaRPr lang="pt-BR"/>
           </a:p>
@@ -2717,7 +2718,7 @@
           <a:p>
             <a:fld id="{40750879-1695-4505-B74A-AEC693370F9E}" type="datetimeFigureOut">
               <a:rPr lang="pt-BR" smtClean="0"/>
-              <a:t>10/05/2018</a:t>
+              <a:t>11/05/2018</a:t>
             </a:fld>
             <a:endParaRPr lang="pt-BR"/>
           </a:p>
@@ -3005,7 +3006,7 @@
           <a:p>
             <a:fld id="{40750879-1695-4505-B74A-AEC693370F9E}" type="datetimeFigureOut">
               <a:rPr lang="pt-BR" smtClean="0"/>
-              <a:t>10/05/2018</a:t>
+              <a:t>11/05/2018</a:t>
             </a:fld>
             <a:endParaRPr lang="pt-BR"/>
           </a:p>
@@ -3246,7 +3247,7 @@
           <a:p>
             <a:fld id="{40750879-1695-4505-B74A-AEC693370F9E}" type="datetimeFigureOut">
               <a:rPr lang="pt-BR" smtClean="0"/>
-              <a:t>10/05/2018</a:t>
+              <a:t>11/05/2018</a:t>
             </a:fld>
             <a:endParaRPr lang="pt-BR"/>
           </a:p>
@@ -3652,6 +3653,1296 @@
     <p:bg>
       <p:bgPr>
         <a:solidFill>
+          <a:schemeClr val="bg2">
+            <a:lumMod val="90000"/>
+            <a:alpha val="25000"/>
+          </a:schemeClr>
+        </a:solidFill>
+        <a:effectLst/>
+      </p:bgPr>
+    </p:bg>
+    <p:spTree>
+      <p:nvGrpSpPr>
+        <p:cNvPr id="1" name=""/>
+        <p:cNvGrpSpPr/>
+        <p:nvPr/>
+      </p:nvGrpSpPr>
+      <p:grpSpPr>
+        <a:xfrm>
+          <a:off x="0" y="0"/>
+          <a:ext cx="0" cy="0"/>
+          <a:chOff x="0" y="0"/>
+          <a:chExt cx="0" cy="0"/>
+        </a:xfrm>
+      </p:grpSpPr>
+      <p:sp>
+        <p:nvSpPr>
+          <p:cNvPr id="3" name="Retângulo 2">
+            <a:extLst>
+              <a:ext uri="{FF2B5EF4-FFF2-40B4-BE49-F238E27FC236}">
+                <a16:creationId xmlns:a16="http://schemas.microsoft.com/office/drawing/2014/main" id="{2DB73CE9-D23C-4BA6-9DDA-75D8A8A0FB3C}"/>
+              </a:ext>
+            </a:extLst>
+          </p:cNvPr>
+          <p:cNvSpPr/>
+          <p:nvPr/>
+        </p:nvSpPr>
+        <p:spPr>
+          <a:xfrm>
+            <a:off x="-1" y="912103"/>
+            <a:ext cx="2737278" cy="461665"/>
+          </a:xfrm>
+          <a:prstGeom prst="rect">
+            <a:avLst/>
+          </a:prstGeom>
+          <a:solidFill>
+            <a:schemeClr val="tx1">
+              <a:lumMod val="75000"/>
+              <a:lumOff val="25000"/>
+            </a:schemeClr>
+          </a:solidFill>
+          <a:ln>
+            <a:noFill/>
+          </a:ln>
+        </p:spPr>
+        <p:style>
+          <a:lnRef idx="2">
+            <a:schemeClr val="accent1">
+              <a:shade val="50000"/>
+            </a:schemeClr>
+          </a:lnRef>
+          <a:fillRef idx="1">
+            <a:schemeClr val="accent1"/>
+          </a:fillRef>
+          <a:effectRef idx="0">
+            <a:schemeClr val="accent1"/>
+          </a:effectRef>
+          <a:fontRef idx="minor">
+            <a:schemeClr val="lt1"/>
+          </a:fontRef>
+        </p:style>
+        <p:txBody>
+          <a:bodyPr rtlCol="0" anchor="ctr"/>
+          <a:lstStyle/>
+          <a:p>
+            <a:pPr algn="ctr"/>
+            <a:endParaRPr lang="pt-BR"/>
+          </a:p>
+        </p:txBody>
+      </p:sp>
+      <p:sp>
+        <p:nvSpPr>
+          <p:cNvPr id="4" name="CaixaDeTexto 3">
+            <a:extLst>
+              <a:ext uri="{FF2B5EF4-FFF2-40B4-BE49-F238E27FC236}">
+                <a16:creationId xmlns:a16="http://schemas.microsoft.com/office/drawing/2014/main" id="{52CBAE71-6D64-4702-A1DA-15C294F4C9AE}"/>
+              </a:ext>
+            </a:extLst>
+          </p:cNvPr>
+          <p:cNvSpPr txBox="1"/>
+          <p:nvPr/>
+        </p:nvSpPr>
+        <p:spPr>
+          <a:xfrm>
+            <a:off x="0" y="0"/>
+            <a:ext cx="3048527" cy="276999"/>
+          </a:xfrm>
+          <a:prstGeom prst="rect">
+            <a:avLst/>
+          </a:prstGeom>
+          <a:noFill/>
+        </p:spPr>
+        <p:txBody>
+          <a:bodyPr wrap="none" rtlCol="0">
+            <a:spAutoFit/>
+          </a:bodyPr>
+          <a:lstStyle/>
+          <a:p>
+            <a:r>
+              <a:rPr lang="pt-BR" sz="1200" spc="300" dirty="0">
+                <a:solidFill>
+                  <a:schemeClr val="tx1">
+                    <a:lumMod val="50000"/>
+                    <a:lumOff val="50000"/>
+                  </a:schemeClr>
+                </a:solidFill>
+                <a:latin typeface="+mj-lt"/>
+              </a:rPr>
+              <a:t>Plano de Trabalho – GT-CEAD</a:t>
+            </a:r>
+          </a:p>
+        </p:txBody>
+      </p:sp>
+      <p:sp>
+        <p:nvSpPr>
+          <p:cNvPr id="2" name="CaixaDeTexto 1">
+            <a:extLst>
+              <a:ext uri="{FF2B5EF4-FFF2-40B4-BE49-F238E27FC236}">
+                <a16:creationId xmlns:a16="http://schemas.microsoft.com/office/drawing/2014/main" id="{6A5094C4-2F06-443A-9CBA-64FBDEA72E6F}"/>
+              </a:ext>
+            </a:extLst>
+          </p:cNvPr>
+          <p:cNvSpPr txBox="1"/>
+          <p:nvPr/>
+        </p:nvSpPr>
+        <p:spPr>
+          <a:xfrm>
+            <a:off x="731600" y="912103"/>
+            <a:ext cx="2005677" cy="461665"/>
+          </a:xfrm>
+          <a:prstGeom prst="rect">
+            <a:avLst/>
+          </a:prstGeom>
+          <a:noFill/>
+        </p:spPr>
+        <p:txBody>
+          <a:bodyPr wrap="none" rtlCol="0">
+            <a:spAutoFit/>
+          </a:bodyPr>
+          <a:lstStyle/>
+          <a:p>
+            <a:r>
+              <a:rPr lang="pt-BR" sz="2400" b="1" dirty="0">
+                <a:solidFill>
+                  <a:schemeClr val="bg1"/>
+                </a:solidFill>
+              </a:rPr>
+              <a:t>Quem somos?</a:t>
+            </a:r>
+          </a:p>
+        </p:txBody>
+      </p:sp>
+      <p:sp>
+        <p:nvSpPr>
+          <p:cNvPr id="8" name="CaixaDeTexto 7">
+            <a:extLst>
+              <a:ext uri="{FF2B5EF4-FFF2-40B4-BE49-F238E27FC236}">
+                <a16:creationId xmlns:a16="http://schemas.microsoft.com/office/drawing/2014/main" id="{BD12757E-97C2-4959-8223-CAFB02EC873B}"/>
+              </a:ext>
+            </a:extLst>
+          </p:cNvPr>
+          <p:cNvSpPr txBox="1"/>
+          <p:nvPr/>
+        </p:nvSpPr>
+        <p:spPr>
+          <a:xfrm>
+            <a:off x="2737277" y="958269"/>
+            <a:ext cx="9254328" cy="369332"/>
+          </a:xfrm>
+          <a:prstGeom prst="rect">
+            <a:avLst/>
+          </a:prstGeom>
+          <a:noFill/>
+        </p:spPr>
+        <p:txBody>
+          <a:bodyPr wrap="none" rtlCol="0">
+            <a:spAutoFit/>
+          </a:bodyPr>
+          <a:lstStyle/>
+          <a:p>
+            <a:r>
+              <a:rPr lang="pt-BR" b="1" spc="110" dirty="0">
+                <a:solidFill>
+                  <a:schemeClr val="tx1">
+                    <a:lumMod val="75000"/>
+                    <a:lumOff val="25000"/>
+                  </a:schemeClr>
+                </a:solidFill>
+              </a:rPr>
+              <a:t>Grupo Técnico de Comunicação Estratégica e Análise de Dados Avançada – GT-CEAD</a:t>
+            </a:r>
+          </a:p>
+        </p:txBody>
+      </p:sp>
+      <p:sp>
+        <p:nvSpPr>
+          <p:cNvPr id="9" name="CaixaDeTexto 8">
+            <a:extLst>
+              <a:ext uri="{FF2B5EF4-FFF2-40B4-BE49-F238E27FC236}">
+                <a16:creationId xmlns:a16="http://schemas.microsoft.com/office/drawing/2014/main" id="{54FF780F-CAEC-4C2C-904F-D7F559A0FEDF}"/>
+              </a:ext>
+            </a:extLst>
+          </p:cNvPr>
+          <p:cNvSpPr txBox="1"/>
+          <p:nvPr/>
+        </p:nvSpPr>
+        <p:spPr>
+          <a:xfrm>
+            <a:off x="227640" y="1556549"/>
+            <a:ext cx="11736719" cy="5216813"/>
+          </a:xfrm>
+          <a:prstGeom prst="rect">
+            <a:avLst/>
+          </a:prstGeom>
+          <a:noFill/>
+        </p:spPr>
+        <p:txBody>
+          <a:bodyPr wrap="square" rtlCol="0">
+            <a:spAutoFit/>
+          </a:bodyPr>
+          <a:lstStyle/>
+          <a:p>
+            <a:pPr>
+              <a:spcAft>
+                <a:spcPts val="600"/>
+              </a:spcAft>
+            </a:pPr>
+            <a:r>
+              <a:rPr lang="pt-BR" dirty="0">
+                <a:solidFill>
+                  <a:schemeClr val="tx1">
+                    <a:lumMod val="85000"/>
+                    <a:lumOff val="15000"/>
+                  </a:schemeClr>
+                </a:solidFill>
+                <a:latin typeface="+mj-lt"/>
+              </a:rPr>
+              <a:t>Instituído pela </a:t>
+            </a:r>
+            <a:r>
+              <a:rPr lang="pt-BR" dirty="0">
+                <a:solidFill>
+                  <a:srgbClr val="C00000"/>
+                </a:solidFill>
+                <a:latin typeface="+mj-lt"/>
+              </a:rPr>
+              <a:t>Portaria STN nº 855, de 2017</a:t>
+            </a:r>
+            <a:r>
+              <a:rPr lang="pt-BR" dirty="0">
+                <a:solidFill>
+                  <a:schemeClr val="tx1">
+                    <a:lumMod val="85000"/>
+                    <a:lumOff val="15000"/>
+                  </a:schemeClr>
+                </a:solidFill>
+                <a:latin typeface="+mj-lt"/>
+              </a:rPr>
+              <a:t>, para (art. 1º):</a:t>
+            </a:r>
+          </a:p>
+          <a:p>
+            <a:pPr marL="742950" lvl="1" indent="-285750">
+              <a:lnSpc>
+                <a:spcPct val="125000"/>
+              </a:lnSpc>
+              <a:buFont typeface="Wingdings" panose="05000000000000000000" pitchFamily="2" charset="2"/>
+              <a:buChar char="§"/>
+            </a:pPr>
+            <a:r>
+              <a:rPr lang="pt-BR" sz="1600" dirty="0">
+                <a:latin typeface="+mj-lt"/>
+              </a:rPr>
+              <a:t>executar atividades de </a:t>
+            </a:r>
+            <a:r>
+              <a:rPr lang="pt-BR" sz="1600" dirty="0">
+                <a:solidFill>
+                  <a:srgbClr val="C00000"/>
+                </a:solidFill>
+                <a:latin typeface="+mj-lt"/>
+              </a:rPr>
+              <a:t>comunicação estratégica institucional</a:t>
+            </a:r>
+            <a:r>
+              <a:rPr lang="pt-BR" sz="1600" dirty="0">
+                <a:latin typeface="+mj-lt"/>
+              </a:rPr>
+              <a:t> e de </a:t>
+            </a:r>
+            <a:r>
+              <a:rPr lang="pt-BR" sz="1600" dirty="0">
+                <a:solidFill>
+                  <a:srgbClr val="C00000"/>
+                </a:solidFill>
+                <a:latin typeface="+mj-lt"/>
+              </a:rPr>
+              <a:t>análise de dados avançada</a:t>
+            </a:r>
+            <a:r>
+              <a:rPr lang="pt-BR" sz="1600" dirty="0">
+                <a:latin typeface="+mj-lt"/>
+              </a:rPr>
+              <a:t>, </a:t>
+            </a:r>
+          </a:p>
+          <a:p>
+            <a:pPr marL="742950" lvl="1" indent="-285750">
+              <a:lnSpc>
+                <a:spcPct val="125000"/>
+              </a:lnSpc>
+              <a:buFont typeface="Wingdings" panose="05000000000000000000" pitchFamily="2" charset="2"/>
+              <a:buChar char="§"/>
+            </a:pPr>
+            <a:r>
+              <a:rPr lang="pt-BR" sz="1600" dirty="0">
+                <a:latin typeface="+mj-lt"/>
+              </a:rPr>
+              <a:t>com foco </a:t>
+            </a:r>
+            <a:r>
+              <a:rPr lang="pt-BR" sz="1600" dirty="0">
+                <a:solidFill>
+                  <a:srgbClr val="C00000"/>
+                </a:solidFill>
+                <a:latin typeface="+mj-lt"/>
+              </a:rPr>
+              <a:t>na promoção da transparência </a:t>
+            </a:r>
+            <a:r>
+              <a:rPr lang="pt-BR" sz="1600" dirty="0">
+                <a:latin typeface="+mj-lt"/>
+              </a:rPr>
+              <a:t>pública e no aprimoramento de práticas relacionadas às atribuições desta STN, </a:t>
+            </a:r>
+          </a:p>
+          <a:p>
+            <a:pPr marL="742950" lvl="1" indent="-285750">
+              <a:lnSpc>
+                <a:spcPct val="125000"/>
+              </a:lnSpc>
+              <a:buFont typeface="Wingdings" panose="05000000000000000000" pitchFamily="2" charset="2"/>
+              <a:buChar char="§"/>
+            </a:pPr>
+            <a:r>
+              <a:rPr lang="pt-BR" sz="1600" dirty="0">
+                <a:latin typeface="+mj-lt"/>
+              </a:rPr>
+              <a:t>apoiando a produção e a divulgação de conhecimento, com vistas a </a:t>
+            </a:r>
+            <a:r>
+              <a:rPr lang="pt-BR" sz="1600" dirty="0">
+                <a:solidFill>
+                  <a:srgbClr val="C00000"/>
+                </a:solidFill>
+                <a:latin typeface="+mj-lt"/>
+              </a:rPr>
+              <a:t>colaborar para o debate de políticas públicas</a:t>
+            </a:r>
+            <a:r>
+              <a:rPr lang="pt-BR" sz="1600" dirty="0">
+                <a:latin typeface="+mj-lt"/>
+              </a:rPr>
+              <a:t>, </a:t>
+            </a:r>
+          </a:p>
+          <a:p>
+            <a:pPr marL="742950" lvl="1" indent="-285750">
+              <a:lnSpc>
+                <a:spcPct val="125000"/>
+              </a:lnSpc>
+              <a:spcAft>
+                <a:spcPts val="600"/>
+              </a:spcAft>
+              <a:buFont typeface="Wingdings" panose="05000000000000000000" pitchFamily="2" charset="2"/>
+              <a:buChar char="§"/>
+            </a:pPr>
+            <a:r>
+              <a:rPr lang="pt-BR" sz="1600" dirty="0">
+                <a:latin typeface="+mj-lt"/>
+              </a:rPr>
+              <a:t>promovendo </a:t>
+            </a:r>
+            <a:r>
+              <a:rPr lang="pt-BR" sz="1600" dirty="0">
+                <a:solidFill>
+                  <a:srgbClr val="C00000"/>
+                </a:solidFill>
+                <a:latin typeface="+mj-lt"/>
+              </a:rPr>
+              <a:t>maior disponibilidade de informações </a:t>
+            </a:r>
+            <a:r>
+              <a:rPr lang="pt-BR" sz="1600" dirty="0">
+                <a:latin typeface="+mj-lt"/>
+              </a:rPr>
+              <a:t>em temas que a sociedade não encontra facilmente fontes para análises de forma objetiva. </a:t>
+            </a:r>
+          </a:p>
+          <a:p>
+            <a:pPr marL="285750" indent="-285750">
+              <a:lnSpc>
+                <a:spcPct val="125000"/>
+              </a:lnSpc>
+              <a:spcAft>
+                <a:spcPts val="600"/>
+              </a:spcAft>
+              <a:buFont typeface="Wingdings" panose="05000000000000000000" pitchFamily="2" charset="2"/>
+              <a:buChar char="§"/>
+            </a:pPr>
+            <a:r>
+              <a:rPr lang="pt-BR" dirty="0">
+                <a:solidFill>
+                  <a:schemeClr val="tx1">
+                    <a:lumMod val="85000"/>
+                    <a:lumOff val="15000"/>
+                  </a:schemeClr>
+                </a:solidFill>
+                <a:latin typeface="+mj-lt"/>
+              </a:rPr>
+              <a:t>Equipe </a:t>
+            </a:r>
+            <a:r>
+              <a:rPr lang="pt-BR" dirty="0">
+                <a:solidFill>
+                  <a:srgbClr val="C00000"/>
+                </a:solidFill>
+                <a:latin typeface="+mj-lt"/>
+              </a:rPr>
+              <a:t>multidisciplinar</a:t>
+            </a:r>
+            <a:r>
+              <a:rPr lang="pt-BR" dirty="0">
+                <a:solidFill>
+                  <a:schemeClr val="tx1">
+                    <a:lumMod val="85000"/>
+                    <a:lumOff val="15000"/>
+                  </a:schemeClr>
+                </a:solidFill>
+                <a:latin typeface="+mj-lt"/>
+              </a:rPr>
+              <a:t> com dedicação exclusiva selecionada por meio de processos seletivos (art. 2º)</a:t>
+            </a:r>
+          </a:p>
+          <a:p>
+            <a:pPr marL="285750" indent="-285750">
+              <a:lnSpc>
+                <a:spcPct val="125000"/>
+              </a:lnSpc>
+              <a:spcAft>
+                <a:spcPts val="600"/>
+              </a:spcAft>
+              <a:buFont typeface="Wingdings" panose="05000000000000000000" pitchFamily="2" charset="2"/>
+              <a:buChar char="§"/>
+            </a:pPr>
+            <a:r>
+              <a:rPr lang="pt-BR" dirty="0">
+                <a:solidFill>
+                  <a:schemeClr val="tx1">
+                    <a:lumMod val="85000"/>
+                    <a:lumOff val="15000"/>
+                  </a:schemeClr>
+                </a:solidFill>
+                <a:latin typeface="+mj-lt"/>
+              </a:rPr>
+              <a:t>Grupo responde diretamente ao </a:t>
+            </a:r>
+            <a:r>
+              <a:rPr lang="pt-BR" dirty="0">
+                <a:solidFill>
+                  <a:srgbClr val="C00000"/>
+                </a:solidFill>
+                <a:latin typeface="+mj-lt"/>
+              </a:rPr>
+              <a:t>Secretário-Adjunto</a:t>
+            </a:r>
+            <a:r>
+              <a:rPr lang="pt-BR" dirty="0">
+                <a:solidFill>
+                  <a:schemeClr val="tx1">
+                    <a:lumMod val="85000"/>
+                    <a:lumOff val="15000"/>
+                  </a:schemeClr>
+                </a:solidFill>
+                <a:latin typeface="+mj-lt"/>
+              </a:rPr>
+              <a:t> (art. 2º)</a:t>
+            </a:r>
+          </a:p>
+          <a:p>
+            <a:pPr marL="285750" indent="-285750">
+              <a:lnSpc>
+                <a:spcPct val="125000"/>
+              </a:lnSpc>
+              <a:spcAft>
+                <a:spcPts val="600"/>
+              </a:spcAft>
+              <a:buFont typeface="Wingdings" panose="05000000000000000000" pitchFamily="2" charset="2"/>
+              <a:buChar char="§"/>
+            </a:pPr>
+            <a:r>
+              <a:rPr lang="pt-BR" dirty="0">
+                <a:latin typeface="+mj-lt"/>
+              </a:rPr>
+              <a:t>Constitui objetivo do GT-CEAD produzir trabalhos de pesquisa relativos a </a:t>
+            </a:r>
+            <a:r>
+              <a:rPr lang="pt-BR" dirty="0">
+                <a:solidFill>
+                  <a:srgbClr val="C00000"/>
+                </a:solidFill>
+                <a:latin typeface="+mj-lt"/>
+              </a:rPr>
+              <a:t>temas de interesse estratégico </a:t>
+            </a:r>
+            <a:r>
+              <a:rPr lang="pt-BR" dirty="0">
+                <a:latin typeface="+mj-lt"/>
+              </a:rPr>
+              <a:t>da STN (art. 3º)</a:t>
+            </a:r>
+          </a:p>
+          <a:p>
+            <a:pPr marL="285750" indent="-285750">
+              <a:lnSpc>
+                <a:spcPct val="125000"/>
+              </a:lnSpc>
+              <a:spcAft>
+                <a:spcPts val="600"/>
+              </a:spcAft>
+              <a:buFont typeface="Wingdings" panose="05000000000000000000" pitchFamily="2" charset="2"/>
+              <a:buChar char="§"/>
+            </a:pPr>
+            <a:r>
+              <a:rPr lang="pt-BR" dirty="0">
+                <a:latin typeface="+mj-lt"/>
+              </a:rPr>
+              <a:t>Nos trabalhos em articulação com as áreas de negócio da STN, o GT-CEAD contará com a </a:t>
+            </a:r>
+            <a:r>
+              <a:rPr lang="pt-BR" dirty="0">
+                <a:solidFill>
+                  <a:srgbClr val="C00000"/>
+                </a:solidFill>
+                <a:latin typeface="+mj-lt"/>
+              </a:rPr>
+              <a:t>colaboração eventual de servidores designados</a:t>
+            </a:r>
+            <a:r>
+              <a:rPr lang="pt-BR" dirty="0">
+                <a:latin typeface="+mj-lt"/>
+              </a:rPr>
+              <a:t> pelos respectivos Subsecretários (art. 4º)</a:t>
+            </a:r>
+          </a:p>
+          <a:p>
+            <a:pPr marL="285750" indent="-285750">
+              <a:lnSpc>
+                <a:spcPct val="125000"/>
+              </a:lnSpc>
+              <a:spcAft>
+                <a:spcPts val="600"/>
+              </a:spcAft>
+              <a:buFont typeface="Wingdings" panose="05000000000000000000" pitchFamily="2" charset="2"/>
+              <a:buChar char="§"/>
+            </a:pPr>
+            <a:r>
+              <a:rPr lang="pt-BR" dirty="0">
+                <a:latin typeface="+mj-lt"/>
+              </a:rPr>
+              <a:t>O GT-CEAD funcionará pelo prazo de </a:t>
+            </a:r>
+            <a:r>
+              <a:rPr lang="pt-BR" dirty="0">
+                <a:solidFill>
+                  <a:srgbClr val="C00000"/>
+                </a:solidFill>
+                <a:latin typeface="+mj-lt"/>
+              </a:rPr>
+              <a:t>2 (dois) anos</a:t>
+            </a:r>
+            <a:r>
+              <a:rPr lang="pt-BR" dirty="0">
+                <a:latin typeface="+mj-lt"/>
+              </a:rPr>
+              <a:t> (art. 6º)</a:t>
+            </a:r>
+          </a:p>
+          <a:p>
+            <a:pPr marL="285750" indent="-285750">
+              <a:lnSpc>
+                <a:spcPct val="125000"/>
+              </a:lnSpc>
+              <a:spcAft>
+                <a:spcPts val="600"/>
+              </a:spcAft>
+              <a:buFont typeface="Wingdings" panose="05000000000000000000" pitchFamily="2" charset="2"/>
+              <a:buChar char="§"/>
+            </a:pPr>
+            <a:r>
+              <a:rPr lang="pt-BR" dirty="0">
+                <a:latin typeface="+mj-lt"/>
+              </a:rPr>
+              <a:t>Trimestralmente, o GT-CEAD submeterá ao conhecimento do </a:t>
+            </a:r>
+            <a:r>
+              <a:rPr lang="pt-BR" dirty="0">
+                <a:solidFill>
+                  <a:srgbClr val="C00000"/>
+                </a:solidFill>
+                <a:latin typeface="+mj-lt"/>
+              </a:rPr>
+              <a:t>Comitê de Gestão (COGES)</a:t>
+            </a:r>
+            <a:r>
+              <a:rPr lang="pt-BR" dirty="0">
+                <a:latin typeface="+mj-lt"/>
+              </a:rPr>
+              <a:t> relatório sobre o andamento de suas atividades no último período (art. 7º)</a:t>
+            </a:r>
+            <a:endParaRPr lang="pt-BR" dirty="0">
+              <a:solidFill>
+                <a:schemeClr val="tx1">
+                  <a:lumMod val="85000"/>
+                  <a:lumOff val="15000"/>
+                </a:schemeClr>
+              </a:solidFill>
+              <a:latin typeface="+mj-lt"/>
+            </a:endParaRPr>
+          </a:p>
+        </p:txBody>
+      </p:sp>
+    </p:spTree>
+    <p:extLst>
+      <p:ext uri="{BB962C8B-B14F-4D97-AF65-F5344CB8AC3E}">
+        <p14:creationId xmlns:p14="http://schemas.microsoft.com/office/powerpoint/2010/main" val="676492906"/>
+      </p:ext>
+    </p:extLst>
+  </p:cSld>
+  <p:clrMapOvr>
+    <a:masterClrMapping/>
+  </p:clrMapOvr>
+  <p:timing>
+    <p:tnLst>
+      <p:par>
+        <p:cTn id="1" dur="indefinite" restart="never" nodeType="tmRoot">
+          <p:childTnLst>
+            <p:seq concurrent="1" nextAc="seek">
+              <p:cTn id="2" dur="indefinite" nodeType="mainSeq">
+                <p:childTnLst>
+                  <p:par>
+                    <p:cTn id="3" fill="hold">
+                      <p:stCondLst>
+                        <p:cond delay="indefinite"/>
+                      </p:stCondLst>
+                      <p:childTnLst>
+                        <p:par>
+                          <p:cTn id="4" fill="hold">
+                            <p:stCondLst>
+                              <p:cond delay="0"/>
+                            </p:stCondLst>
+                            <p:childTnLst>
+                              <p:par>
+                                <p:cTn id="5" presetID="10" presetClass="entr" presetSubtype="0" fill="hold" grpId="0" nodeType="clickEffect">
+                                  <p:stCondLst>
+                                    <p:cond delay="0"/>
+                                  </p:stCondLst>
+                                  <p:childTnLst>
+                                    <p:set>
+                                      <p:cBhvr>
+                                        <p:cTn id="6" dur="1" fill="hold">
+                                          <p:stCondLst>
+                                            <p:cond delay="0"/>
+                                          </p:stCondLst>
+                                        </p:cTn>
+                                        <p:tgtEl>
+                                          <p:spTgt spid="9">
+                                            <p:txEl>
+                                              <p:pRg st="0" end="0"/>
+                                            </p:txEl>
+                                          </p:spTgt>
+                                        </p:tgtEl>
+                                        <p:attrNameLst>
+                                          <p:attrName>style.visibility</p:attrName>
+                                        </p:attrNameLst>
+                                      </p:cBhvr>
+                                      <p:to>
+                                        <p:strVal val="visible"/>
+                                      </p:to>
+                                    </p:set>
+                                    <p:animEffect transition="in" filter="fade">
+                                      <p:cBhvr>
+                                        <p:cTn id="7" dur="500"/>
+                                        <p:tgtEl>
+                                          <p:spTgt spid="9">
+                                            <p:txEl>
+                                              <p:pRg st="0" end="0"/>
+                                            </p:txEl>
+                                          </p:spTgt>
+                                        </p:tgtEl>
+                                      </p:cBhvr>
+                                    </p:animEffect>
+                                  </p:childTnLst>
+                                </p:cTn>
+                              </p:par>
+                              <p:par>
+                                <p:cTn id="8" presetID="10" presetClass="entr" presetSubtype="0" fill="hold" grpId="0" nodeType="withEffect">
+                                  <p:stCondLst>
+                                    <p:cond delay="0"/>
+                                  </p:stCondLst>
+                                  <p:childTnLst>
+                                    <p:set>
+                                      <p:cBhvr>
+                                        <p:cTn id="9" dur="1" fill="hold">
+                                          <p:stCondLst>
+                                            <p:cond delay="0"/>
+                                          </p:stCondLst>
+                                        </p:cTn>
+                                        <p:tgtEl>
+                                          <p:spTgt spid="9">
+                                            <p:txEl>
+                                              <p:pRg st="1" end="1"/>
+                                            </p:txEl>
+                                          </p:spTgt>
+                                        </p:tgtEl>
+                                        <p:attrNameLst>
+                                          <p:attrName>style.visibility</p:attrName>
+                                        </p:attrNameLst>
+                                      </p:cBhvr>
+                                      <p:to>
+                                        <p:strVal val="visible"/>
+                                      </p:to>
+                                    </p:set>
+                                    <p:animEffect transition="in" filter="fade">
+                                      <p:cBhvr>
+                                        <p:cTn id="10" dur="500"/>
+                                        <p:tgtEl>
+                                          <p:spTgt spid="9">
+                                            <p:txEl>
+                                              <p:pRg st="1" end="1"/>
+                                            </p:txEl>
+                                          </p:spTgt>
+                                        </p:tgtEl>
+                                      </p:cBhvr>
+                                    </p:animEffect>
+                                  </p:childTnLst>
+                                </p:cTn>
+                              </p:par>
+                              <p:par>
+                                <p:cTn id="11" presetID="10" presetClass="entr" presetSubtype="0" fill="hold" grpId="0" nodeType="withEffect">
+                                  <p:stCondLst>
+                                    <p:cond delay="0"/>
+                                  </p:stCondLst>
+                                  <p:childTnLst>
+                                    <p:set>
+                                      <p:cBhvr>
+                                        <p:cTn id="12" dur="1" fill="hold">
+                                          <p:stCondLst>
+                                            <p:cond delay="0"/>
+                                          </p:stCondLst>
+                                        </p:cTn>
+                                        <p:tgtEl>
+                                          <p:spTgt spid="9">
+                                            <p:txEl>
+                                              <p:pRg st="2" end="2"/>
+                                            </p:txEl>
+                                          </p:spTgt>
+                                        </p:tgtEl>
+                                        <p:attrNameLst>
+                                          <p:attrName>style.visibility</p:attrName>
+                                        </p:attrNameLst>
+                                      </p:cBhvr>
+                                      <p:to>
+                                        <p:strVal val="visible"/>
+                                      </p:to>
+                                    </p:set>
+                                    <p:animEffect transition="in" filter="fade">
+                                      <p:cBhvr>
+                                        <p:cTn id="13" dur="500"/>
+                                        <p:tgtEl>
+                                          <p:spTgt spid="9">
+                                            <p:txEl>
+                                              <p:pRg st="2" end="2"/>
+                                            </p:txEl>
+                                          </p:spTgt>
+                                        </p:tgtEl>
+                                      </p:cBhvr>
+                                    </p:animEffect>
+                                  </p:childTnLst>
+                                </p:cTn>
+                              </p:par>
+                              <p:par>
+                                <p:cTn id="14" presetID="10" presetClass="entr" presetSubtype="0" fill="hold" grpId="0" nodeType="withEffect">
+                                  <p:stCondLst>
+                                    <p:cond delay="0"/>
+                                  </p:stCondLst>
+                                  <p:childTnLst>
+                                    <p:set>
+                                      <p:cBhvr>
+                                        <p:cTn id="15" dur="1" fill="hold">
+                                          <p:stCondLst>
+                                            <p:cond delay="0"/>
+                                          </p:stCondLst>
+                                        </p:cTn>
+                                        <p:tgtEl>
+                                          <p:spTgt spid="9">
+                                            <p:txEl>
+                                              <p:pRg st="3" end="3"/>
+                                            </p:txEl>
+                                          </p:spTgt>
+                                        </p:tgtEl>
+                                        <p:attrNameLst>
+                                          <p:attrName>style.visibility</p:attrName>
+                                        </p:attrNameLst>
+                                      </p:cBhvr>
+                                      <p:to>
+                                        <p:strVal val="visible"/>
+                                      </p:to>
+                                    </p:set>
+                                    <p:animEffect transition="in" filter="fade">
+                                      <p:cBhvr>
+                                        <p:cTn id="16" dur="500"/>
+                                        <p:tgtEl>
+                                          <p:spTgt spid="9">
+                                            <p:txEl>
+                                              <p:pRg st="3" end="3"/>
+                                            </p:txEl>
+                                          </p:spTgt>
+                                        </p:tgtEl>
+                                      </p:cBhvr>
+                                    </p:animEffect>
+                                  </p:childTnLst>
+                                </p:cTn>
+                              </p:par>
+                              <p:par>
+                                <p:cTn id="17" presetID="10" presetClass="entr" presetSubtype="0" fill="hold" grpId="0" nodeType="withEffect">
+                                  <p:stCondLst>
+                                    <p:cond delay="0"/>
+                                  </p:stCondLst>
+                                  <p:childTnLst>
+                                    <p:set>
+                                      <p:cBhvr>
+                                        <p:cTn id="18" dur="1" fill="hold">
+                                          <p:stCondLst>
+                                            <p:cond delay="0"/>
+                                          </p:stCondLst>
+                                        </p:cTn>
+                                        <p:tgtEl>
+                                          <p:spTgt spid="9">
+                                            <p:txEl>
+                                              <p:pRg st="4" end="4"/>
+                                            </p:txEl>
+                                          </p:spTgt>
+                                        </p:tgtEl>
+                                        <p:attrNameLst>
+                                          <p:attrName>style.visibility</p:attrName>
+                                        </p:attrNameLst>
+                                      </p:cBhvr>
+                                      <p:to>
+                                        <p:strVal val="visible"/>
+                                      </p:to>
+                                    </p:set>
+                                    <p:animEffect transition="in" filter="fade">
+                                      <p:cBhvr>
+                                        <p:cTn id="19" dur="500"/>
+                                        <p:tgtEl>
+                                          <p:spTgt spid="9">
+                                            <p:txEl>
+                                              <p:pRg st="4" end="4"/>
+                                            </p:txEl>
+                                          </p:spTgt>
+                                        </p:tgtEl>
+                                      </p:cBhvr>
+                                    </p:animEffect>
+                                  </p:childTnLst>
+                                </p:cTn>
+                              </p:par>
+                            </p:childTnLst>
+                          </p:cTn>
+                        </p:par>
+                      </p:childTnLst>
+                    </p:cTn>
+                  </p:par>
+                  <p:par>
+                    <p:cTn id="20" fill="hold">
+                      <p:stCondLst>
+                        <p:cond delay="indefinite"/>
+                      </p:stCondLst>
+                      <p:childTnLst>
+                        <p:par>
+                          <p:cTn id="21" fill="hold">
+                            <p:stCondLst>
+                              <p:cond delay="0"/>
+                            </p:stCondLst>
+                            <p:childTnLst>
+                              <p:par>
+                                <p:cTn id="22" presetID="10" presetClass="entr" presetSubtype="0" fill="hold" grpId="0" nodeType="clickEffect">
+                                  <p:stCondLst>
+                                    <p:cond delay="0"/>
+                                  </p:stCondLst>
+                                  <p:childTnLst>
+                                    <p:set>
+                                      <p:cBhvr>
+                                        <p:cTn id="23" dur="1" fill="hold">
+                                          <p:stCondLst>
+                                            <p:cond delay="0"/>
+                                          </p:stCondLst>
+                                        </p:cTn>
+                                        <p:tgtEl>
+                                          <p:spTgt spid="9">
+                                            <p:txEl>
+                                              <p:pRg st="5" end="5"/>
+                                            </p:txEl>
+                                          </p:spTgt>
+                                        </p:tgtEl>
+                                        <p:attrNameLst>
+                                          <p:attrName>style.visibility</p:attrName>
+                                        </p:attrNameLst>
+                                      </p:cBhvr>
+                                      <p:to>
+                                        <p:strVal val="visible"/>
+                                      </p:to>
+                                    </p:set>
+                                    <p:animEffect transition="in" filter="fade">
+                                      <p:cBhvr>
+                                        <p:cTn id="24" dur="500"/>
+                                        <p:tgtEl>
+                                          <p:spTgt spid="9">
+                                            <p:txEl>
+                                              <p:pRg st="5" end="5"/>
+                                            </p:txEl>
+                                          </p:spTgt>
+                                        </p:tgtEl>
+                                      </p:cBhvr>
+                                    </p:animEffect>
+                                  </p:childTnLst>
+                                </p:cTn>
+                              </p:par>
+                            </p:childTnLst>
+                          </p:cTn>
+                        </p:par>
+                      </p:childTnLst>
+                    </p:cTn>
+                  </p:par>
+                  <p:par>
+                    <p:cTn id="25" fill="hold">
+                      <p:stCondLst>
+                        <p:cond delay="indefinite"/>
+                      </p:stCondLst>
+                      <p:childTnLst>
+                        <p:par>
+                          <p:cTn id="26" fill="hold">
+                            <p:stCondLst>
+                              <p:cond delay="0"/>
+                            </p:stCondLst>
+                            <p:childTnLst>
+                              <p:par>
+                                <p:cTn id="27" presetID="10" presetClass="entr" presetSubtype="0" fill="hold" grpId="0" nodeType="clickEffect">
+                                  <p:stCondLst>
+                                    <p:cond delay="0"/>
+                                  </p:stCondLst>
+                                  <p:childTnLst>
+                                    <p:set>
+                                      <p:cBhvr>
+                                        <p:cTn id="28" dur="1" fill="hold">
+                                          <p:stCondLst>
+                                            <p:cond delay="0"/>
+                                          </p:stCondLst>
+                                        </p:cTn>
+                                        <p:tgtEl>
+                                          <p:spTgt spid="9">
+                                            <p:txEl>
+                                              <p:pRg st="6" end="6"/>
+                                            </p:txEl>
+                                          </p:spTgt>
+                                        </p:tgtEl>
+                                        <p:attrNameLst>
+                                          <p:attrName>style.visibility</p:attrName>
+                                        </p:attrNameLst>
+                                      </p:cBhvr>
+                                      <p:to>
+                                        <p:strVal val="visible"/>
+                                      </p:to>
+                                    </p:set>
+                                    <p:animEffect transition="in" filter="fade">
+                                      <p:cBhvr>
+                                        <p:cTn id="29" dur="500"/>
+                                        <p:tgtEl>
+                                          <p:spTgt spid="9">
+                                            <p:txEl>
+                                              <p:pRg st="6" end="6"/>
+                                            </p:txEl>
+                                          </p:spTgt>
+                                        </p:tgtEl>
+                                      </p:cBhvr>
+                                    </p:animEffect>
+                                  </p:childTnLst>
+                                </p:cTn>
+                              </p:par>
+                            </p:childTnLst>
+                          </p:cTn>
+                        </p:par>
+                      </p:childTnLst>
+                    </p:cTn>
+                  </p:par>
+                  <p:par>
+                    <p:cTn id="30" fill="hold">
+                      <p:stCondLst>
+                        <p:cond delay="indefinite"/>
+                      </p:stCondLst>
+                      <p:childTnLst>
+                        <p:par>
+                          <p:cTn id="31" fill="hold">
+                            <p:stCondLst>
+                              <p:cond delay="0"/>
+                            </p:stCondLst>
+                            <p:childTnLst>
+                              <p:par>
+                                <p:cTn id="32" presetID="10" presetClass="entr" presetSubtype="0" fill="hold" grpId="0" nodeType="clickEffect">
+                                  <p:stCondLst>
+                                    <p:cond delay="0"/>
+                                  </p:stCondLst>
+                                  <p:childTnLst>
+                                    <p:set>
+                                      <p:cBhvr>
+                                        <p:cTn id="33" dur="1" fill="hold">
+                                          <p:stCondLst>
+                                            <p:cond delay="0"/>
+                                          </p:stCondLst>
+                                        </p:cTn>
+                                        <p:tgtEl>
+                                          <p:spTgt spid="9">
+                                            <p:txEl>
+                                              <p:pRg st="7" end="7"/>
+                                            </p:txEl>
+                                          </p:spTgt>
+                                        </p:tgtEl>
+                                        <p:attrNameLst>
+                                          <p:attrName>style.visibility</p:attrName>
+                                        </p:attrNameLst>
+                                      </p:cBhvr>
+                                      <p:to>
+                                        <p:strVal val="visible"/>
+                                      </p:to>
+                                    </p:set>
+                                    <p:animEffect transition="in" filter="fade">
+                                      <p:cBhvr>
+                                        <p:cTn id="34" dur="500"/>
+                                        <p:tgtEl>
+                                          <p:spTgt spid="9">
+                                            <p:txEl>
+                                              <p:pRg st="7" end="7"/>
+                                            </p:txEl>
+                                          </p:spTgt>
+                                        </p:tgtEl>
+                                      </p:cBhvr>
+                                    </p:animEffect>
+                                  </p:childTnLst>
+                                </p:cTn>
+                              </p:par>
+                            </p:childTnLst>
+                          </p:cTn>
+                        </p:par>
+                      </p:childTnLst>
+                    </p:cTn>
+                  </p:par>
+                  <p:par>
+                    <p:cTn id="35" fill="hold">
+                      <p:stCondLst>
+                        <p:cond delay="indefinite"/>
+                      </p:stCondLst>
+                      <p:childTnLst>
+                        <p:par>
+                          <p:cTn id="36" fill="hold">
+                            <p:stCondLst>
+                              <p:cond delay="0"/>
+                            </p:stCondLst>
+                            <p:childTnLst>
+                              <p:par>
+                                <p:cTn id="37" presetID="10" presetClass="entr" presetSubtype="0" fill="hold" grpId="0" nodeType="clickEffect">
+                                  <p:stCondLst>
+                                    <p:cond delay="0"/>
+                                  </p:stCondLst>
+                                  <p:childTnLst>
+                                    <p:set>
+                                      <p:cBhvr>
+                                        <p:cTn id="38" dur="1" fill="hold">
+                                          <p:stCondLst>
+                                            <p:cond delay="0"/>
+                                          </p:stCondLst>
+                                        </p:cTn>
+                                        <p:tgtEl>
+                                          <p:spTgt spid="9">
+                                            <p:txEl>
+                                              <p:pRg st="8" end="8"/>
+                                            </p:txEl>
+                                          </p:spTgt>
+                                        </p:tgtEl>
+                                        <p:attrNameLst>
+                                          <p:attrName>style.visibility</p:attrName>
+                                        </p:attrNameLst>
+                                      </p:cBhvr>
+                                      <p:to>
+                                        <p:strVal val="visible"/>
+                                      </p:to>
+                                    </p:set>
+                                    <p:animEffect transition="in" filter="fade">
+                                      <p:cBhvr>
+                                        <p:cTn id="39" dur="500"/>
+                                        <p:tgtEl>
+                                          <p:spTgt spid="9">
+                                            <p:txEl>
+                                              <p:pRg st="8" end="8"/>
+                                            </p:txEl>
+                                          </p:spTgt>
+                                        </p:tgtEl>
+                                      </p:cBhvr>
+                                    </p:animEffect>
+                                  </p:childTnLst>
+                                </p:cTn>
+                              </p:par>
+                            </p:childTnLst>
+                          </p:cTn>
+                        </p:par>
+                      </p:childTnLst>
+                    </p:cTn>
+                  </p:par>
+                  <p:par>
+                    <p:cTn id="40" fill="hold">
+                      <p:stCondLst>
+                        <p:cond delay="indefinite"/>
+                      </p:stCondLst>
+                      <p:childTnLst>
+                        <p:par>
+                          <p:cTn id="41" fill="hold">
+                            <p:stCondLst>
+                              <p:cond delay="0"/>
+                            </p:stCondLst>
+                            <p:childTnLst>
+                              <p:par>
+                                <p:cTn id="42" presetID="10" presetClass="entr" presetSubtype="0" fill="hold" grpId="0" nodeType="clickEffect">
+                                  <p:stCondLst>
+                                    <p:cond delay="0"/>
+                                  </p:stCondLst>
+                                  <p:childTnLst>
+                                    <p:set>
+                                      <p:cBhvr>
+                                        <p:cTn id="43" dur="1" fill="hold">
+                                          <p:stCondLst>
+                                            <p:cond delay="0"/>
+                                          </p:stCondLst>
+                                        </p:cTn>
+                                        <p:tgtEl>
+                                          <p:spTgt spid="9">
+                                            <p:txEl>
+                                              <p:pRg st="9" end="9"/>
+                                            </p:txEl>
+                                          </p:spTgt>
+                                        </p:tgtEl>
+                                        <p:attrNameLst>
+                                          <p:attrName>style.visibility</p:attrName>
+                                        </p:attrNameLst>
+                                      </p:cBhvr>
+                                      <p:to>
+                                        <p:strVal val="visible"/>
+                                      </p:to>
+                                    </p:set>
+                                    <p:animEffect transition="in" filter="fade">
+                                      <p:cBhvr>
+                                        <p:cTn id="44" dur="500"/>
+                                        <p:tgtEl>
+                                          <p:spTgt spid="9">
+                                            <p:txEl>
+                                              <p:pRg st="9" end="9"/>
+                                            </p:txEl>
+                                          </p:spTgt>
+                                        </p:tgtEl>
+                                      </p:cBhvr>
+                                    </p:animEffect>
+                                  </p:childTnLst>
+                                </p:cTn>
+                              </p:par>
+                            </p:childTnLst>
+                          </p:cTn>
+                        </p:par>
+                      </p:childTnLst>
+                    </p:cTn>
+                  </p:par>
+                  <p:par>
+                    <p:cTn id="45" fill="hold">
+                      <p:stCondLst>
+                        <p:cond delay="indefinite"/>
+                      </p:stCondLst>
+                      <p:childTnLst>
+                        <p:par>
+                          <p:cTn id="46" fill="hold">
+                            <p:stCondLst>
+                              <p:cond delay="0"/>
+                            </p:stCondLst>
+                            <p:childTnLst>
+                              <p:par>
+                                <p:cTn id="47" presetID="10" presetClass="entr" presetSubtype="0" fill="hold" grpId="0" nodeType="clickEffect">
+                                  <p:stCondLst>
+                                    <p:cond delay="0"/>
+                                  </p:stCondLst>
+                                  <p:childTnLst>
+                                    <p:set>
+                                      <p:cBhvr>
+                                        <p:cTn id="48" dur="1" fill="hold">
+                                          <p:stCondLst>
+                                            <p:cond delay="0"/>
+                                          </p:stCondLst>
+                                        </p:cTn>
+                                        <p:tgtEl>
+                                          <p:spTgt spid="9">
+                                            <p:txEl>
+                                              <p:pRg st="10" end="10"/>
+                                            </p:txEl>
+                                          </p:spTgt>
+                                        </p:tgtEl>
+                                        <p:attrNameLst>
+                                          <p:attrName>style.visibility</p:attrName>
+                                        </p:attrNameLst>
+                                      </p:cBhvr>
+                                      <p:to>
+                                        <p:strVal val="visible"/>
+                                      </p:to>
+                                    </p:set>
+                                    <p:animEffect transition="in" filter="fade">
+                                      <p:cBhvr>
+                                        <p:cTn id="49" dur="500"/>
+                                        <p:tgtEl>
+                                          <p:spTgt spid="9">
+                                            <p:txEl>
+                                              <p:pRg st="10" end="10"/>
+                                            </p:txEl>
+                                          </p:spTgt>
+                                        </p:tgtEl>
+                                      </p:cBhvr>
+                                    </p:animEffect>
+                                  </p:childTnLst>
+                                </p:cTn>
+                              </p:par>
+                            </p:childTnLst>
+                          </p:cTn>
+                        </p:par>
+                      </p:childTnLst>
+                    </p:cTn>
+                  </p:par>
+                </p:childTnLst>
+              </p:cTn>
+              <p:prevCondLst>
+                <p:cond evt="onPrev" delay="0">
+                  <p:tgtEl>
+                    <p:sldTgt/>
+                  </p:tgtEl>
+                </p:cond>
+              </p:prevCondLst>
+              <p:nextCondLst>
+                <p:cond evt="onNext" delay="0">
+                  <p:tgtEl>
+                    <p:sldTgt/>
+                  </p:tgtEl>
+                </p:cond>
+              </p:nextCondLst>
+            </p:seq>
+          </p:childTnLst>
+        </p:cTn>
+      </p:par>
+    </p:tnLst>
+    <p:bldLst>
+      <p:bldP spid="9" grpId="0" build="p"/>
+    </p:bldLst>
+  </p:timing>
+</p:sld>
+</file>
+
+<file path=ppt/slides/slide2.xml><?xml version="1.0" encoding="utf-8"?>
+<p:sld xmlns:a="http://schemas.openxmlformats.org/drawingml/2006/main" xmlns:r="http://schemas.openxmlformats.org/officeDocument/2006/relationships" xmlns:p="http://schemas.openxmlformats.org/presentationml/2006/main">
+  <p:cSld>
+    <p:bg>
+      <p:bgPr>
+        <a:solidFill>
           <a:schemeClr val="accent6">
             <a:lumMod val="20000"/>
             <a:lumOff val="80000"/>
@@ -3825,7 +5116,7 @@
         </p:nvSpPr>
         <p:spPr>
           <a:xfrm>
-            <a:off x="1524263" y="2231797"/>
+            <a:off x="1524263" y="2065537"/>
             <a:ext cx="3241400" cy="2739211"/>
           </a:xfrm>
           <a:prstGeom prst="rect">
@@ -3908,10 +5199,6 @@
             </a:r>
           </a:p>
           <a:p>
-            <a:pPr marL="285750" indent="-285750">
-              <a:buFont typeface="Arial" panose="020B0604020202020204" pitchFamily="34" charset="0"/>
-              <a:buChar char="•"/>
-            </a:pPr>
             <a:endParaRPr lang="pt-BR" sz="2400" dirty="0"/>
           </a:p>
         </p:txBody>
@@ -3930,7 +5217,7 @@
         </p:nvSpPr>
         <p:spPr>
           <a:xfrm>
-            <a:off x="6802394" y="2231797"/>
+            <a:off x="6802394" y="2065537"/>
             <a:ext cx="4301562" cy="3477875"/>
           </a:xfrm>
           <a:prstGeom prst="rect">
@@ -4053,7 +5340,7 @@
     </p:spTree>
     <p:extLst>
       <p:ext uri="{BB962C8B-B14F-4D97-AF65-F5344CB8AC3E}">
-        <p14:creationId xmlns:p14="http://schemas.microsoft.com/office/powerpoint/2010/main" val="676492906"/>
+        <p14:creationId xmlns:p14="http://schemas.microsoft.com/office/powerpoint/2010/main" val="28776790"/>
       </p:ext>
     </p:extLst>
   </p:cSld>
@@ -4063,7 +5350,7 @@
 </p:sld>
 </file>
 
-<file path=ppt/slides/slide2.xml><?xml version="1.0" encoding="utf-8"?>
+<file path=ppt/slides/slide3.xml><?xml version="1.0" encoding="utf-8"?>
 <p:sld xmlns:a="http://schemas.openxmlformats.org/drawingml/2006/main" xmlns:r="http://schemas.openxmlformats.org/officeDocument/2006/relationships" xmlns:p="http://schemas.openxmlformats.org/presentationml/2006/main">
   <p:cSld>
     <p:bg>
@@ -6767,7 +8054,7 @@
 </p:sld>
 </file>
 
-<file path=ppt/slides/slide3.xml><?xml version="1.0" encoding="utf-8"?>
+<file path=ppt/slides/slide4.xml><?xml version="1.0" encoding="utf-8"?>
 <p:sld xmlns:a="http://schemas.openxmlformats.org/drawingml/2006/main" xmlns:r="http://schemas.openxmlformats.org/officeDocument/2006/relationships" xmlns:p="http://schemas.openxmlformats.org/presentationml/2006/main">
   <p:cSld>
     <p:bg>
@@ -7065,66 +8352,6 @@
           </a:p>
         </p:txBody>
       </p:sp>
-      <p:pic>
-        <p:nvPicPr>
-          <p:cNvPr id="3" name="Imagem 2">
-            <a:extLst>
-              <a:ext uri="{FF2B5EF4-FFF2-40B4-BE49-F238E27FC236}">
-                <a16:creationId xmlns:a16="http://schemas.microsoft.com/office/drawing/2014/main" id="{AF540575-9F23-4ECF-8081-4710CD7EEEF0}"/>
-              </a:ext>
-            </a:extLst>
-          </p:cNvPr>
-          <p:cNvPicPr>
-            <a:picLocks noChangeAspect="1"/>
-          </p:cNvPicPr>
-          <p:nvPr/>
-        </p:nvPicPr>
-        <p:blipFill>
-          <a:blip r:embed="rId2"/>
-          <a:stretch>
-            <a:fillRect/>
-          </a:stretch>
-        </p:blipFill>
-        <p:spPr>
-          <a:xfrm>
-            <a:off x="3805296" y="655228"/>
-            <a:ext cx="1495425" cy="1152525"/>
-          </a:xfrm>
-          <a:prstGeom prst="rect">
-            <a:avLst/>
-          </a:prstGeom>
-        </p:spPr>
-      </p:pic>
-      <p:pic>
-        <p:nvPicPr>
-          <p:cNvPr id="8" name="Imagem 7">
-            <a:extLst>
-              <a:ext uri="{FF2B5EF4-FFF2-40B4-BE49-F238E27FC236}">
-                <a16:creationId xmlns:a16="http://schemas.microsoft.com/office/drawing/2014/main" id="{D8F11C2E-CE56-40A4-B85E-93481E06436E}"/>
-              </a:ext>
-            </a:extLst>
-          </p:cNvPr>
-          <p:cNvPicPr>
-            <a:picLocks noChangeAspect="1"/>
-          </p:cNvPicPr>
-          <p:nvPr/>
-        </p:nvPicPr>
-        <p:blipFill>
-          <a:blip r:embed="rId3"/>
-          <a:stretch>
-            <a:fillRect/>
-          </a:stretch>
-        </p:blipFill>
-        <p:spPr>
-          <a:xfrm>
-            <a:off x="3805296" y="455203"/>
-            <a:ext cx="1495425" cy="200025"/>
-          </a:xfrm>
-          <a:prstGeom prst="rect">
-            <a:avLst/>
-          </a:prstGeom>
-        </p:spPr>
-      </p:pic>
       <p:cxnSp>
         <p:nvCxnSpPr>
           <p:cNvPr id="10" name="Conector: Angulado 9">
@@ -7302,7 +8529,7 @@
 </p:sld>
 </file>
 
-<file path=ppt/slides/slide4.xml><?xml version="1.0" encoding="utf-8"?>
+<file path=ppt/slides/slide5.xml><?xml version="1.0" encoding="utf-8"?>
 <p:sld xmlns:a="http://schemas.openxmlformats.org/drawingml/2006/main" xmlns:r="http://schemas.openxmlformats.org/officeDocument/2006/relationships" xmlns:p="http://schemas.openxmlformats.org/presentationml/2006/main">
   <p:cSld>
     <p:bg>
@@ -7480,7 +8707,7 @@
         <p:spPr>
           <a:xfrm>
             <a:off x="1435775" y="1463537"/>
-            <a:ext cx="5822876" cy="5170646"/>
+            <a:ext cx="5893601" cy="5170646"/>
           </a:xfrm>
           <a:prstGeom prst="rect">
             <a:avLst/>
@@ -7615,7 +8842,7 @@
               <a:rPr lang="pt-BR" sz="2200" dirty="0">
                 <a:latin typeface="+mj-lt"/>
               </a:rPr>
-              <a:t>A participar das comunidades de ciência de dados</a:t>
+              <a:t>Participação nas comunidades de ciência de dados</a:t>
             </a:r>
           </a:p>
           <a:p>
@@ -7693,43 +8920,6 @@
       </p:pic>
       <p:sp>
         <p:nvSpPr>
-          <p:cNvPr id="8" name="CaixaDeTexto 7">
-            <a:extLst>
-              <a:ext uri="{FF2B5EF4-FFF2-40B4-BE49-F238E27FC236}">
-                <a16:creationId xmlns:a16="http://schemas.microsoft.com/office/drawing/2014/main" id="{014B54B8-F35E-4ECA-9278-1334729560CD}"/>
-              </a:ext>
-            </a:extLst>
-          </p:cNvPr>
-          <p:cNvSpPr txBox="1"/>
-          <p:nvPr/>
-        </p:nvSpPr>
-        <p:spPr>
-          <a:xfrm>
-            <a:off x="5295232" y="3587963"/>
-            <a:ext cx="2301720" cy="276999"/>
-          </a:xfrm>
-          <a:prstGeom prst="rect">
-            <a:avLst/>
-          </a:prstGeom>
-          <a:noFill/>
-        </p:spPr>
-        <p:txBody>
-          <a:bodyPr wrap="none" rtlCol="0">
-            <a:spAutoFit/>
-          </a:bodyPr>
-          <a:lstStyle/>
-          <a:p>
-            <a:r>
-              <a:rPr lang="pt-BR" sz="1200" dirty="0">
-                <a:latin typeface="+mj-lt"/>
-              </a:rPr>
-              <a:t>E até sobre cores! (obrigado, Vivi!)</a:t>
-            </a:r>
-          </a:p>
-        </p:txBody>
-      </p:sp>
-      <p:sp>
-        <p:nvSpPr>
           <p:cNvPr id="3" name="CaixaDeTexto 2">
             <a:extLst>
               <a:ext uri="{FF2B5EF4-FFF2-40B4-BE49-F238E27FC236}">
@@ -7742,7 +8932,7 @@
         </p:nvSpPr>
         <p:spPr>
           <a:xfrm>
-            <a:off x="8875388" y="4460700"/>
+            <a:off x="7929453" y="863539"/>
             <a:ext cx="2417650" cy="1646092"/>
           </a:xfrm>
           <a:prstGeom prst="rect">
@@ -7813,52 +9003,6 @@
           </a:p>
         </p:txBody>
       </p:sp>
-      <p:cxnSp>
-        <p:nvCxnSpPr>
-          <p:cNvPr id="9" name="Conector de Seta Reta 8">
-            <a:extLst>
-              <a:ext uri="{FF2B5EF4-FFF2-40B4-BE49-F238E27FC236}">
-                <a16:creationId xmlns:a16="http://schemas.microsoft.com/office/drawing/2014/main" id="{5B6D643A-7611-4913-B60F-DF9290E658BD}"/>
-              </a:ext>
-            </a:extLst>
-          </p:cNvPr>
-          <p:cNvCxnSpPr>
-            <a:cxnSpLocks/>
-          </p:cNvCxnSpPr>
-          <p:nvPr/>
-        </p:nvCxnSpPr>
-        <p:spPr>
-          <a:xfrm>
-            <a:off x="4267379" y="3726463"/>
-            <a:ext cx="772671" cy="0"/>
-          </a:xfrm>
-          <a:prstGeom prst="straightConnector1">
-            <a:avLst/>
-          </a:prstGeom>
-          <a:ln>
-            <a:solidFill>
-              <a:schemeClr val="accent4">
-                <a:lumMod val="50000"/>
-              </a:schemeClr>
-            </a:solidFill>
-            <a:tailEnd type="triangle"/>
-          </a:ln>
-        </p:spPr>
-        <p:style>
-          <a:lnRef idx="1">
-            <a:schemeClr val="accent1"/>
-          </a:lnRef>
-          <a:fillRef idx="0">
-            <a:schemeClr val="accent1"/>
-          </a:fillRef>
-          <a:effectRef idx="0">
-            <a:schemeClr val="accent1"/>
-          </a:effectRef>
-          <a:fontRef idx="minor">
-            <a:schemeClr val="tx1"/>
-          </a:fontRef>
-        </p:style>
-      </p:cxnSp>
     </p:spTree>
     <p:extLst>
       <p:ext uri="{BB962C8B-B14F-4D97-AF65-F5344CB8AC3E}">

</xml_diff>

<commit_message>
atualização do plano de trabalho e alteração de gráfico na análise de municípios para torná-lo interativo
</commit_message>
<xml_diff>
--- a/downloads/PlanoDeTrabalho.pptx
+++ b/downloads/PlanoDeTrabalho.pptx
@@ -9003,6 +9003,172 @@
           </a:p>
         </p:txBody>
       </p:sp>
+      <p:cxnSp>
+        <p:nvCxnSpPr>
+          <p:cNvPr id="8" name="Conector de Seta Reta 7">
+            <a:extLst>
+              <a:ext uri="{FF2B5EF4-FFF2-40B4-BE49-F238E27FC236}">
+                <a16:creationId xmlns:a16="http://schemas.microsoft.com/office/drawing/2014/main" id="{490B17E9-AADE-4BD0-9627-2A06B0637009}"/>
+              </a:ext>
+            </a:extLst>
+          </p:cNvPr>
+          <p:cNvCxnSpPr>
+            <a:cxnSpLocks/>
+          </p:cNvCxnSpPr>
+          <p:nvPr/>
+        </p:nvCxnSpPr>
+        <p:spPr>
+          <a:xfrm flipH="1">
+            <a:off x="3519376" y="2360428"/>
+            <a:ext cx="1158950" cy="0"/>
+          </a:xfrm>
+          <a:prstGeom prst="straightConnector1">
+            <a:avLst/>
+          </a:prstGeom>
+          <a:ln>
+            <a:solidFill>
+              <a:schemeClr val="accent4">
+                <a:lumMod val="75000"/>
+              </a:schemeClr>
+            </a:solidFill>
+            <a:tailEnd type="triangle"/>
+          </a:ln>
+        </p:spPr>
+        <p:style>
+          <a:lnRef idx="1">
+            <a:schemeClr val="accent1"/>
+          </a:lnRef>
+          <a:fillRef idx="0">
+            <a:schemeClr val="accent1"/>
+          </a:fillRef>
+          <a:effectRef idx="0">
+            <a:schemeClr val="accent1"/>
+          </a:effectRef>
+          <a:fontRef idx="minor">
+            <a:schemeClr val="tx1"/>
+          </a:fontRef>
+        </p:style>
+      </p:cxnSp>
+      <p:sp>
+        <p:nvSpPr>
+          <p:cNvPr id="10" name="CaixaDeTexto 9">
+            <a:extLst>
+              <a:ext uri="{FF2B5EF4-FFF2-40B4-BE49-F238E27FC236}">
+                <a16:creationId xmlns:a16="http://schemas.microsoft.com/office/drawing/2014/main" id="{C83D0551-FFE2-4478-AC89-5EBA183082C2}"/>
+              </a:ext>
+            </a:extLst>
+          </p:cNvPr>
+          <p:cNvSpPr txBox="1"/>
+          <p:nvPr/>
+        </p:nvSpPr>
+        <p:spPr>
+          <a:xfrm>
+            <a:off x="4678326" y="2237317"/>
+            <a:ext cx="1104790" cy="246221"/>
+          </a:xfrm>
+          <a:prstGeom prst="rect">
+            <a:avLst/>
+          </a:prstGeom>
+          <a:noFill/>
+        </p:spPr>
+        <p:txBody>
+          <a:bodyPr wrap="none" rtlCol="0">
+            <a:spAutoFit/>
+          </a:bodyPr>
+          <a:lstStyle/>
+          <a:p>
+            <a:r>
+              <a:rPr lang="pt-BR" sz="1000" dirty="0">
+                <a:latin typeface="+mj-lt"/>
+              </a:rPr>
+              <a:t>(obrigado, Hugo!)</a:t>
+            </a:r>
+          </a:p>
+        </p:txBody>
+      </p:sp>
+      <p:cxnSp>
+        <p:nvCxnSpPr>
+          <p:cNvPr id="12" name="Conector de Seta Reta 11">
+            <a:extLst>
+              <a:ext uri="{FF2B5EF4-FFF2-40B4-BE49-F238E27FC236}">
+                <a16:creationId xmlns:a16="http://schemas.microsoft.com/office/drawing/2014/main" id="{7EC21BA0-5741-4C64-9BE7-A466A88D5972}"/>
+              </a:ext>
+            </a:extLst>
+          </p:cNvPr>
+          <p:cNvCxnSpPr>
+            <a:cxnSpLocks/>
+          </p:cNvCxnSpPr>
+          <p:nvPr/>
+        </p:nvCxnSpPr>
+        <p:spPr>
+          <a:xfrm flipH="1">
+            <a:off x="4098851" y="3709479"/>
+            <a:ext cx="1158950" cy="0"/>
+          </a:xfrm>
+          <a:prstGeom prst="straightConnector1">
+            <a:avLst/>
+          </a:prstGeom>
+          <a:ln>
+            <a:solidFill>
+              <a:schemeClr val="accent4">
+                <a:lumMod val="75000"/>
+              </a:schemeClr>
+            </a:solidFill>
+            <a:tailEnd type="triangle"/>
+          </a:ln>
+        </p:spPr>
+        <p:style>
+          <a:lnRef idx="1">
+            <a:schemeClr val="accent1"/>
+          </a:lnRef>
+          <a:fillRef idx="0">
+            <a:schemeClr val="accent1"/>
+          </a:fillRef>
+          <a:effectRef idx="0">
+            <a:schemeClr val="accent1"/>
+          </a:effectRef>
+          <a:fontRef idx="minor">
+            <a:schemeClr val="tx1"/>
+          </a:fontRef>
+        </p:style>
+      </p:cxnSp>
+      <p:sp>
+        <p:nvSpPr>
+          <p:cNvPr id="13" name="CaixaDeTexto 12">
+            <a:extLst>
+              <a:ext uri="{FF2B5EF4-FFF2-40B4-BE49-F238E27FC236}">
+                <a16:creationId xmlns:a16="http://schemas.microsoft.com/office/drawing/2014/main" id="{380004A9-82AC-459A-AD9E-70184A11DF5F}"/>
+              </a:ext>
+            </a:extLst>
+          </p:cNvPr>
+          <p:cNvSpPr txBox="1"/>
+          <p:nvPr/>
+        </p:nvSpPr>
+        <p:spPr>
+          <a:xfrm>
+            <a:off x="5257801" y="3575735"/>
+            <a:ext cx="1975221" cy="246221"/>
+          </a:xfrm>
+          <a:prstGeom prst="rect">
+            <a:avLst/>
+          </a:prstGeom>
+          <a:noFill/>
+        </p:spPr>
+        <p:txBody>
+          <a:bodyPr wrap="none" rtlCol="0">
+            <a:spAutoFit/>
+          </a:bodyPr>
+          <a:lstStyle/>
+          <a:p>
+            <a:r>
+              <a:rPr lang="pt-BR" sz="1000" dirty="0">
+                <a:latin typeface="+mj-lt"/>
+              </a:rPr>
+              <a:t>(e até sobre cores! obrigado, Vivi!)</a:t>
+            </a:r>
+          </a:p>
+        </p:txBody>
+      </p:sp>
     </p:spTree>
     <p:extLst>
       <p:ext uri="{BB962C8B-B14F-4D97-AF65-F5344CB8AC3E}">

</xml_diff>